<commit_message>
update README and presentation
</commit_message>
<xml_diff>
--- a/docs/presentation.pptx
+++ b/docs/presentation.pptx
@@ -8595,11 +8595,11 @@
             </a:r>
             <a:r>
               <a:rPr lang="en-US" altLang="zh-CN" dirty="0"/>
-              <a:t>Github Actions</a:t>
+              <a:t>Github Actions </a:t>
             </a:r>
             <a:r>
               <a:rPr lang="zh-CN" altLang="en-US" dirty="0"/>
-              <a:t>自动编译打包发布</a:t>
+              <a:t>自动编译打包发布 </a:t>
             </a:r>
             <a:r>
               <a:rPr lang="en-US" altLang="zh-CN" dirty="0"/>

</xml_diff>